<commit_message>
documentatie vebeterd door feedback
</commit_message>
<xml_diff>
--- a/Documentatie/Design/How_to_disappear.pptx
+++ b/Documentatie/Design/How_to_disappear.pptx
@@ -165,6 +165,148 @@
           <inkml:channelProperty channel="F" name="resolution" value="0" units="1/dev"/>
         </inkml:channelProperties>
       </inkml:inkSource>
+      <inkml:timestamp xml:id="ts0" timeString="2022-06-23T11:57:34.451"/>
+    </inkml:context>
+    <inkml:brush xml:id="br0">
+      <inkml:brushProperty name="width" value="0.05" units="cm"/>
+      <inkml:brushProperty name="height" value="0.05" units="cm"/>
+      <inkml:brushProperty name="color" value="#33CCFF"/>
+    </inkml:brush>
+  </inkml:definitions>
+  <inkml:trace contextRef="#ctx0" brushRef="#br0">2255 3628 24575,'-1'-8'0,"-1"0"0,1 0 0,-1 0 0,-1 0 0,0 0 0,0 1 0,-7-14 0,-2-6 0,-19-35 0,-1 1 0,-4 1 0,-49-62 0,-38-65 0,85 113 0,26 46 0,-23-35 0,-118-133 0,52 73 0,79 91 0,2 0 0,-25-56 0,-6-9 0,-176-276 0,-33-1 0,196 290 0,6-1 0,-66-131 0,6 9 0,-91-154 50,-115-172-1465,274 467-5411</inkml:trace>
+</inkml:ink>
+</file>
+
+<file path=ppt/ink/ink2.xml><?xml version="1.0" encoding="utf-8"?>
+<inkml:ink xmlns:inkml="http://www.w3.org/2003/InkML">
+  <inkml:definitions>
+    <inkml:context xml:id="ctx0">
+      <inkml:inkSource xml:id="inkSrc0">
+        <inkml:traceFormat>
+          <inkml:channel name="X" type="integer" min="-2.14748E9" max="2.14748E9" units="cm"/>
+          <inkml:channel name="Y" type="integer" min="-2.14748E9" max="2.14748E9" units="cm"/>
+          <inkml:channel name="F" type="integer" max="32767" units="dev"/>
+        </inkml:traceFormat>
+        <inkml:channelProperties>
+          <inkml:channelProperty channel="X" name="resolution" value="1000" units="1/cm"/>
+          <inkml:channelProperty channel="Y" name="resolution" value="1000" units="1/cm"/>
+          <inkml:channelProperty channel="F" name="resolution" value="0" units="1/dev"/>
+        </inkml:channelProperties>
+      </inkml:inkSource>
+      <inkml:timestamp xml:id="ts0" timeString="2022-06-23T11:57:36.187"/>
+    </inkml:context>
+    <inkml:brush xml:id="br0">
+      <inkml:brushProperty name="width" value="0.05" units="cm"/>
+      <inkml:brushProperty name="height" value="0.05" units="cm"/>
+      <inkml:brushProperty name="color" value="#33CCFF"/>
+    </inkml:brush>
+  </inkml:definitions>
+  <inkml:trace contextRef="#ctx0" brushRef="#br0">0 2851 24575,'1'1'0,"0"-1"0,0 0 0,0 1 0,-1-1 0,1 0 0,0 0 0,0 1 0,0-1 0,0 0 0,0 0 0,0 0 0,0 0 0,0 0 0,-1 0 0,1 0 0,0-1 0,0 1 0,0 0 0,0 0 0,0-1 0,0 1 0,-1-1 0,1 1 0,0 0 0,0-1 0,-1 1 0,1-1 0,0 0 0,-1 1 0,1-1 0,0 0 0,0-1 0,15-29 0,-13 23 0,90-254 0,-52 143 0,64-134 0,-35 91 0,-4-20 0,-17 43 0,329-690 0,-141 397 0,-185 333 0,26-43 0,-56 106-682,32-72-1,-38 66-6143</inkml:trace>
+</inkml:ink>
+</file>
+
+<file path=ppt/ink/ink3.xml><?xml version="1.0" encoding="utf-8"?>
+<inkml:ink xmlns:inkml="http://www.w3.org/2003/InkML">
+  <inkml:definitions>
+    <inkml:context xml:id="ctx0">
+      <inkml:inkSource xml:id="inkSrc0">
+        <inkml:traceFormat>
+          <inkml:channel name="X" type="integer" min="-2.14748E9" max="2.14748E9" units="cm"/>
+          <inkml:channel name="Y" type="integer" min="-2.14748E9" max="2.14748E9" units="cm"/>
+          <inkml:channel name="F" type="integer" max="32767" units="dev"/>
+        </inkml:traceFormat>
+        <inkml:channelProperties>
+          <inkml:channelProperty channel="X" name="resolution" value="1000" units="1/cm"/>
+          <inkml:channelProperty channel="Y" name="resolution" value="1000" units="1/cm"/>
+          <inkml:channelProperty channel="F" name="resolution" value="0" units="1/dev"/>
+        </inkml:channelProperties>
+      </inkml:inkSource>
+      <inkml:timestamp xml:id="ts0" timeString="2022-06-23T11:57:39.567"/>
+    </inkml:context>
+    <inkml:brush xml:id="br0">
+      <inkml:brushProperty name="width" value="0.05" units="cm"/>
+      <inkml:brushProperty name="height" value="0.05" units="cm"/>
+      <inkml:brushProperty name="color" value="#33CCFF"/>
+    </inkml:brush>
+  </inkml:definitions>
+  <inkml:trace contextRef="#ctx0" brushRef="#br0">638 7334 24575,'-2'-3'0,"0"1"0,1-1 0,-1 0 0,1 0 0,-1 0 0,1 0 0,0 0 0,0 0 0,1 0 0,-1 0 0,1-1 0,-1 1 0,1-5 0,-2-11 0,-8-41 0,-97-508 0,61 378 0,-84-386 0,114 499 0,-4-23 0,-8-105 0,25 181 0,-2-1 0,0 1 0,-15-38 0,10 32 0,-9-47 0,7-26 0,5-1 0,9-139 0,1 74 0,-4 43 0,-19-141 0,-27-22 0,-1-6 0,37 201 0,1-112 0,14-1399 0,-6 1564 0,-2 0 0,-12-55 0,-2-15 0,5-78 0,11-195 0,5 168 0,-3-420-1365,0 601-5461</inkml:trace>
+</inkml:ink>
+</file>
+
+<file path=ppt/ink/ink4.xml><?xml version="1.0" encoding="utf-8"?>
+<inkml:ink xmlns:inkml="http://www.w3.org/2003/InkML">
+  <inkml:definitions>
+    <inkml:context xml:id="ctx0">
+      <inkml:inkSource xml:id="inkSrc0">
+        <inkml:traceFormat>
+          <inkml:channel name="X" type="integer" min="-2.14748E9" max="2.14748E9" units="cm"/>
+          <inkml:channel name="Y" type="integer" min="-2.14748E9" max="2.14748E9" units="cm"/>
+        </inkml:traceFormat>
+        <inkml:channelProperties>
+          <inkml:channelProperty channel="X" name="resolution" value="1000" units="1/cm"/>
+          <inkml:channelProperty channel="Y" name="resolution" value="1000" units="1/cm"/>
+        </inkml:channelProperties>
+      </inkml:inkSource>
+      <inkml:timestamp xml:id="ts0" timeString="2022-06-23T11:57:47.541"/>
+    </inkml:context>
+    <inkml:brush xml:id="br0">
+      <inkml:brushProperty name="width" value="0.3" units="cm"/>
+      <inkml:brushProperty name="height" value="0.6" units="cm"/>
+      <inkml:brushProperty name="color" value="#0069AF"/>
+      <inkml:brushProperty name="tip" value="rectangle"/>
+      <inkml:brushProperty name="rasterOp" value="maskPen"/>
+      <inkml:brushProperty name="ignorePressure" value="1"/>
+    </inkml:brush>
+  </inkml:definitions>
+  <inkml:trace contextRef="#ctx0" brushRef="#br0">1 0,'0'9,"4"17,11 16,16 11,12 1,4-8,-3-13,-8-12</inkml:trace>
+</inkml:ink>
+</file>
+
+<file path=ppt/ink/ink5.xml><?xml version="1.0" encoding="utf-8"?>
+<inkml:ink xmlns:inkml="http://www.w3.org/2003/InkML">
+  <inkml:definitions>
+    <inkml:context xml:id="ctx0">
+      <inkml:inkSource xml:id="inkSrc0">
+        <inkml:traceFormat>
+          <inkml:channel name="X" type="integer" min="-2.14748E9" max="2.14748E9" units="cm"/>
+          <inkml:channel name="Y" type="integer" min="-2.14748E9" max="2.14748E9" units="cm"/>
+        </inkml:traceFormat>
+        <inkml:channelProperties>
+          <inkml:channelProperty channel="X" name="resolution" value="1000" units="1/cm"/>
+          <inkml:channelProperty channel="Y" name="resolution" value="1000" units="1/cm"/>
+        </inkml:channelProperties>
+      </inkml:inkSource>
+      <inkml:timestamp xml:id="ts0" timeString="2022-06-23T11:57:50.481"/>
+    </inkml:context>
+    <inkml:brush xml:id="br0">
+      <inkml:brushProperty name="width" value="0.3" units="cm"/>
+      <inkml:brushProperty name="height" value="0.6" units="cm"/>
+      <inkml:brushProperty name="color" value="#0069AF"/>
+      <inkml:brushProperty name="tip" value="rectangle"/>
+      <inkml:brushProperty name="rasterOp" value="maskPen"/>
+      <inkml:brushProperty name="ignorePressure" value="1"/>
+    </inkml:brush>
+  </inkml:definitions>
+  <inkml:trace contextRef="#ctx0" brushRef="#br0">409 1019,'0'-3,"0"0,0 0,0 0,1 0,-1 0,1 0,-1 0,1 0,0 0,0 1,0-1,1 0,-1 1,1-1,-1 1,1-1,3-2,-1 2,0 0,-1 1,1 0,0-1,0 2,1-1,-1 0,0 1,0 0,1 0,4 0,-5 0,0 0,0 0,0 1,0 0,1 0,-1 0,0 0,0 1,0 0,0-1,0 1,0 1,0-1,-1 1,1-1,0 1,-1 0,1 0,-1 1,0-1,0 1,0 0,0 0,0 0,0 0,-1 0,1 0,-1 1,0-1,0 1,0 0,-1-1,1 1,-1 0,0 0,0 0,-1 0,1 0,-1 0,1 0,-1 1,-1 6,1-9,0 0,0 0,0 0,0 0,-1 0,1 0,0 0,-1 0,1 0,-1 0,0 0,0 0,0 0,0 0,0-1,0 1,0 0,-1-1,1 1,0-1,-1 1,1-1,-1 0,0 0,1 1,-1-1,-3 1,2-2,0 0,1 0,-1 0,0 0,1 0,-1-1,1 1,-1-1,1 0,-1 0,1 1,-1-2,1 1,0 0,0 0,-1-1,1 0,0 1,0-1,1 0,-1 0,-2-2,-20-24,2-1,1 0,1-2,1 0,2-1,-19-50,32 73,1 0,0-1,1 0,0 1,1-1,0 0,0 0,1 0,0 0,0 0,4-13,-2 16,0 1,0 0,1 0,0 0,0 0,0 0,1 0,0 1,0 0,0 0,1 0,0 0,0 1,0 0,0 0,0 0,10-4,-1 0,0 2,0-1,0 2,1 0,0 1,0 0,0 1,0 1,1 0,-1 1,1 1,-1 1,1 0,-1 1,0 0,0 1,0 1,0 0,0 1,-1 1,0 0,0 1,0 1,20 15,-20-12,0 1,-1 1,-1 0,0 1,-1 0,0 1,-1 0,0 1,-2 0,0 0,-1 1,0 0,-1 0,-1 0,-1 1,-1 0,0 0,-1 0,-1 0,-2 31,1-44,-1 0,0 0,0 0,0-1,-1 1,1-1,-1 1,0-1,0 0,-1 1,1-1,-1 0,0 0,0-1,-1 1,1-1,-1 0,1 1,-1-1,0-1,0 1,0-1,-1 1,1-1,0-1,-1 1,0-1,-4 2,-10 1,0 0,-1-1,1-1,-1-1,-32-3,33 1,-1-1,0-1,1-1,-1 0,1-2,0 0,-24-13,34 15,1 0,0-1,0 0,1 0,0-1,0 0,0 0,0-1,1 0,0 0,1 0,-1-1,1 0,1 0,0 0,0-1,0 1,-2-10,4 8,0 0,1 0,0 0,0 0,1 0,0 0,1 0,0 0,0 1,1-1,1 0,5-15,-5 19,0 0,0 1,0-1,1 1,-1-1,1 1,1 1,-1-1,1 0,0 1,0 0,0 0,0 1,1-1,0 1,-1 0,1 1,0-1,0 1,11-2,-7 2,0 0,-1 1,1 1,0-1,0 1,0 1,0 0,0 0,0 1,0 0,-1 1,1 0,-1 1,0 0,0 0,0 1,11 7,-12-5,1 0,-1 0,0 1,-1 0,0 1,0 0,-1 0,0 0,0 0,-1 1,-1 0,0 0,0 1,-1-1,4 19,-6-26,0 0,0 1,-1-1,1 1,-1-1,0 1,0-1,0 1,0-1,-1 1,0-1,1 1,-1-1,0 1,-1-1,1 0,0 0,-1 1,0-1,0 0,0-1,0 1,0 0,-1 0,1-1,-1 0,1 1,-1-1,0 0,0 0,0-1,-6 4,-8 1,0 0,0-1,0-1,0-1,-1 0,-21 0,-5-2,-58-6,82 3,0 0,0-1,1-2,0 0,-36-14,48 15,0 1,0-1,0 0,1 0,0-1,0 0,0 0,1 0,-1-1,1 0,1 0,-1 0,1-1,0 1,0-1,1 0,0 0,-3-10,2 2,1-1,1 1,0-1,1 0,0 0,1 0,1 0,1 0,4-19,-5 31,1 1,0-1,-1 1,2 0,-1-1,0 1,0 1,1-1,0 0,0 0,-1 1,1 0,1-1,-1 1,0 0,0 1,1-1,-1 1,1-1,0 1,-1 0,1 0,0 1,7-1,5-1,0 1,0 0,0 2,26 3,-27-2,0 2,0-1,0 2,-1 0,0 0,0 2,0 0,-1 0,0 1,0 1,-1 0,20 19,-24-20,0 1,-1 0,0 1,0 0,-1 0,0 1,-1-1,0 1,0 0,-1 0,-1 1,0-1,-1 1,0 0,0 0,-1 22,-2-29,1-1,0 0,-1 1,0-1,0 0,0 1,0-1,-1 0,0 0,0 0,0 0,0 0,-1-1,1 1,-1-1,0 1,-4 3,1-3,1 0,-1 0,0-1,0 0,0 0,0 0,0-1,-1 0,1 0,-10 1,-2-1,1 0,0-1,0-2,-1 1,1-2,0 0,0-2,-19-5,17 3,1-1,-1-1,2-1,-1-1,1 0,0-1,1-1,1-1,-24-23,29 25,1 0,0 0,1 0,0-1,1 0,0-1,1 0,1 0,0 0,0-1,1 1,1-1,1 0,-2-19,3-26,7-63,-5 115,0 0,0 0,1 0,0 1,0-1,0 1,1-1,0 1,0 0,1 0,0 0,0 0,0 1,9-10,-4 8,0 0,1 0,-1 0,1 1,0 1,1 0,-1 0,15-4,4 2,0 0,1 2,0 1,-1 1,1 2,33 2,-24 3,1 2,-1 1,1 3,-2 0,0 3,0 1,-1 2,-1 1,-1 2,-1 1,0 2,-1 1,53 51,-77-65,0 0,0 1,-1 0,-1 0,1 1,5 11,-12-19,1 0,-1 0,0 0,0 0,0 1,0-1,0 0,-1 1,0-1,1 0,-1 1,0-1,-1 0,1 1,-1-1,1 1,-1-1,0 0,0 0,0 0,-1 0,1 0,-1 0,0 0,0 0,-3 4,-2 0,0 0,-1 0,0-1,0 0,-1 0,0-1,-11 5,-70 25,64-26,-62 19,-3-5,0-3,0-4,-2-4,0-4,-133-7,216-1,0 0,1-1,-1-1,1 0,-1 0,1-1,0 0,0 0,-13-7,17 6,0 1,0-1,1 0,-1 0,1 0,-1-1,2 0,-1 0,0 0,1 0,0 0,0-1,0 1,1-1,-3-11,-2-15,3-1,0 1,2-1,2 0,5-48,-3 36,1-12,3 1,14-60,-13 86,2 0,0 1,2 0,2 0,21-38,-29 60,0-1,0 1,1 1,0-1,1 1,-1 0,1 0,0 0,0 1,1 0,0 1,0 0,0 0,0 1,1 0,-1 0,1 1,-1 0,1 0,0 1,0 0,10 1,15 1,1 2,-1 2,0 1,44 14,-75-19,40 10,-1 2,0 1,64 33,-91-39,0 1,-1 1,0 0,0 0,-1 1,-1 1,1 0,-2 1,0 1,0-1,-2 2,12 20,-11-11,-1 1,-1 0,-1 0,-1 0,-2 1,0 0,-2 0,-1 1,-1-1,-1 0,-1 0,-1 0,-2 0,0 0,-18 46,19-62,-1 0,0 0,-1-1,0 1,-1-1,0-1,0 1,-1-1,0 0,0-1,-1 0,0 0,0-1,-20 10,-5-1,-1-1,-1-1,-39 7,8-2,17-3,-148 39,168-48,0-1,-1-2,1-1,-52-3,52-4,6-2</inkml:trace>
+</inkml:ink>
+</file>
+
+<file path=ppt/ink/ink6.xml><?xml version="1.0" encoding="utf-8"?>
+<inkml:ink xmlns:inkml="http://www.w3.org/2003/InkML">
+  <inkml:definitions>
+    <inkml:context xml:id="ctx0">
+      <inkml:inkSource xml:id="inkSrc0">
+        <inkml:traceFormat>
+          <inkml:channel name="X" type="integer" min="-2.14748E9" max="2.14748E9" units="cm"/>
+          <inkml:channel name="Y" type="integer" min="-2.14748E9" max="2.14748E9" units="cm"/>
+          <inkml:channel name="F" type="integer" max="32767" units="dev"/>
+        </inkml:traceFormat>
+        <inkml:channelProperties>
+          <inkml:channelProperty channel="X" name="resolution" value="1000" units="1/cm"/>
+          <inkml:channelProperty channel="Y" name="resolution" value="1000" units="1/cm"/>
+          <inkml:channelProperty channel="F" name="resolution" value="0" units="1/dev"/>
+        </inkml:channelProperties>
+      </inkml:inkSource>
       <inkml:timestamp xml:id="ts0" timeString="2022-05-19T07:43:10.597"/>
     </inkml:context>
     <inkml:brush xml:id="br0">
@@ -177,7 +319,7 @@
 </inkml:ink>
 </file>
 
-<file path=ppt/ink/ink2.xml><?xml version="1.0" encoding="utf-8"?>
+<file path=ppt/ink/ink7.xml><?xml version="1.0" encoding="utf-8"?>
 <inkml:ink xmlns:inkml="http://www.w3.org/2003/InkML">
   <inkml:definitions>
     <inkml:context xml:id="ctx0">
@@ -2393,7 +2535,7 @@
             <a:fld id="{A5B0A250-5CC0-1746-B209-08E8B0DAE6AF}" type="datetimeFigureOut">
               <a:rPr lang="en-US" smtClean="0"/>
               <a:pPr algn="l"/>
-              <a:t>6/16/2022</a:t>
+              <a:t>6/23/2022</a:t>
             </a:fld>
             <a:endParaRPr lang="en-US" dirty="0"/>
           </a:p>
@@ -3855,7 +3997,7 @@
           <a:p>
             <a:fld id="{A5B0A250-5CC0-1746-B209-08E8B0DAE6AF}" type="datetimeFigureOut">
               <a:rPr lang="en-US" smtClean="0"/>
-              <a:t>6/16/2022</a:t>
+              <a:t>6/23/2022</a:t>
             </a:fld>
             <a:endParaRPr lang="en-US" dirty="0"/>
           </a:p>
@@ -4785,7 +4927,7 @@
           <a:p>
             <a:fld id="{A5B0A250-5CC0-1746-B209-08E8B0DAE6AF}" type="datetimeFigureOut">
               <a:rPr lang="en-US" smtClean="0"/>
-              <a:t>6/16/2022</a:t>
+              <a:t>6/23/2022</a:t>
             </a:fld>
             <a:endParaRPr lang="en-US"/>
           </a:p>
@@ -6242,7 +6384,7 @@
           <a:p>
             <a:fld id="{A5B0A250-5CC0-1746-B209-08E8B0DAE6AF}" type="datetimeFigureOut">
               <a:rPr lang="en-US" smtClean="0"/>
-              <a:t>6/16/2022</a:t>
+              <a:t>6/23/2022</a:t>
             </a:fld>
             <a:endParaRPr lang="en-US" dirty="0"/>
           </a:p>
@@ -8598,7 +8740,7 @@
           <a:p>
             <a:fld id="{A5B0A250-5CC0-1746-B209-08E8B0DAE6AF}" type="datetimeFigureOut">
               <a:rPr lang="en-US" smtClean="0"/>
-              <a:t>6/16/2022</a:t>
+              <a:t>6/23/2022</a:t>
             </a:fld>
             <a:endParaRPr lang="en-US" dirty="0"/>
           </a:p>
@@ -9639,7 +9781,7 @@
           <a:p>
             <a:fld id="{A5B0A250-5CC0-1746-B209-08E8B0DAE6AF}" type="datetimeFigureOut">
               <a:rPr lang="en-US" smtClean="0"/>
-              <a:t>6/16/2022</a:t>
+              <a:t>6/23/2022</a:t>
             </a:fld>
             <a:endParaRPr lang="en-US" dirty="0"/>
           </a:p>
@@ -10852,7 +10994,7 @@
           <a:p>
             <a:fld id="{A5B0A250-5CC0-1746-B209-08E8B0DAE6AF}" type="datetimeFigureOut">
               <a:rPr lang="en-US" smtClean="0"/>
-              <a:t>6/16/2022</a:t>
+              <a:t>6/23/2022</a:t>
             </a:fld>
             <a:endParaRPr lang="en-US" dirty="0"/>
           </a:p>
@@ -11761,7 +11903,7 @@
           <a:p>
             <a:fld id="{A5B0A250-5CC0-1746-B209-08E8B0DAE6AF}" type="datetimeFigureOut">
               <a:rPr lang="en-US" smtClean="0"/>
-              <a:t>6/16/2022</a:t>
+              <a:t>6/23/2022</a:t>
             </a:fld>
             <a:endParaRPr lang="en-US" dirty="0"/>
           </a:p>
@@ -11920,7 +12062,7 @@
             <a:fld id="{A5B0A250-5CC0-1746-B209-08E8B0DAE6AF}" type="datetimeFigureOut">
               <a:rPr lang="en-US" smtClean="0"/>
               <a:pPr/>
-              <a:t>6/16/2022</a:t>
+              <a:t>6/23/2022</a:t>
             </a:fld>
             <a:endParaRPr lang="en-US" dirty="0"/>
           </a:p>
@@ -12903,7 +13045,7 @@
           <a:p>
             <a:fld id="{A5B0A250-5CC0-1746-B209-08E8B0DAE6AF}" type="datetimeFigureOut">
               <a:rPr lang="en-US" smtClean="0"/>
-              <a:t>6/16/2022</a:t>
+              <a:t>6/23/2022</a:t>
             </a:fld>
             <a:endParaRPr lang="en-US" dirty="0"/>
           </a:p>
@@ -13965,7 +14107,7 @@
           <a:p>
             <a:fld id="{A5B0A250-5CC0-1746-B209-08E8B0DAE6AF}" type="datetimeFigureOut">
               <a:rPr lang="en-US" smtClean="0"/>
-              <a:t>6/16/2022</a:t>
+              <a:t>6/23/2022</a:t>
             </a:fld>
             <a:endParaRPr lang="en-US" dirty="0"/>
           </a:p>
@@ -14253,7 +14395,7 @@
             <a:fld id="{A5B0A250-5CC0-1746-B209-08E8B0DAE6AF}" type="datetimeFigureOut">
               <a:rPr lang="en-US" smtClean="0"/>
               <a:pPr/>
-              <a:t>6/16/2022</a:t>
+              <a:t>6/23/2022</a:t>
             </a:fld>
             <a:endParaRPr lang="en-US" dirty="0"/>
           </a:p>
@@ -16472,7 +16614,7 @@
         <p:spPr>
           <a:xfrm>
             <a:off x="323273" y="1902691"/>
-            <a:ext cx="4035425" cy="923330"/>
+            <a:ext cx="4035425" cy="646331"/>
           </a:xfrm>
           <a:prstGeom prst="rect">
             <a:avLst/>
@@ -16519,11 +16661,11 @@
             </a:r>
             <a:r>
               <a:rPr lang="en-US" dirty="0"/>
-              <a:t> </a:t>
+              <a:t> het </a:t>
             </a:r>
             <a:r>
               <a:rPr lang="en-US" dirty="0" err="1"/>
-              <a:t>proberen</a:t>
+              <a:t>einde</a:t>
             </a:r>
             <a:r>
               <a:rPr lang="en-US" dirty="0"/>
@@ -16539,7 +16681,7 @@
             </a:r>
             <a:r>
               <a:rPr lang="en-US" dirty="0" err="1"/>
-              <a:t>verdwijnen</a:t>
+              <a:t>halen</a:t>
             </a:r>
             <a:endParaRPr lang="nl-NL" dirty="0"/>
           </a:p>
@@ -17043,7 +17185,7 @@
             </a:r>
             <a:r>
               <a:rPr lang="en-US" dirty="0"/>
-              <a:t> door de </a:t>
+              <a:t>, door de </a:t>
             </a:r>
             <a:r>
               <a:rPr lang="en-US" dirty="0" err="1"/>
@@ -17055,11 +17197,27 @@
             </a:r>
             <a:r>
               <a:rPr lang="en-US" dirty="0" err="1"/>
+              <a:t>te</a:t>
+            </a:r>
+            <a:r>
+              <a:rPr lang="en-US" dirty="0"/>
+              <a:t> </a:t>
+            </a:r>
+            <a:r>
+              <a:rPr lang="en-US" dirty="0" err="1"/>
+              <a:t>draaien</a:t>
+            </a:r>
+            <a:r>
+              <a:rPr lang="en-US" dirty="0"/>
+              <a:t> </a:t>
+            </a:r>
+            <a:r>
+              <a:rPr lang="en-US" dirty="0" err="1"/>
               <a:t>en</a:t>
             </a:r>
             <a:r>
               <a:rPr lang="en-US" dirty="0"/>
-              <a:t> die </a:t>
+              <a:t> in het portal </a:t>
             </a:r>
             <a:r>
               <a:rPr lang="en-US" dirty="0" err="1"/>
@@ -17067,11 +17225,11 @@
             </a:r>
             <a:r>
               <a:rPr lang="en-US" dirty="0"/>
-              <a:t> laten </a:t>
+              <a:t> </a:t>
             </a:r>
             <a:r>
               <a:rPr lang="en-US" dirty="0" err="1"/>
-              <a:t>draaien</a:t>
+              <a:t>vallen</a:t>
             </a:r>
             <a:r>
               <a:rPr lang="en-US" dirty="0"/>
@@ -17081,36 +17239,6 @@
           </a:p>
         </p:txBody>
       </p:sp>
-      <p:pic>
-        <p:nvPicPr>
-          <p:cNvPr id="5" name="Picture 4">
-            <a:extLst>
-              <a:ext uri="{FF2B5EF4-FFF2-40B4-BE49-F238E27FC236}">
-                <a16:creationId xmlns:a16="http://schemas.microsoft.com/office/drawing/2014/main" id="{2C3F6098-7B43-59D5-8274-3184C8C87385}"/>
-              </a:ext>
-            </a:extLst>
-          </p:cNvPr>
-          <p:cNvPicPr>
-            <a:picLocks noChangeAspect="1"/>
-          </p:cNvPicPr>
-          <p:nvPr/>
-        </p:nvPicPr>
-        <p:blipFill>
-          <a:blip r:embed="rId2"/>
-          <a:stretch>
-            <a:fillRect/>
-          </a:stretch>
-        </p:blipFill>
-        <p:spPr>
-          <a:xfrm>
-            <a:off x="5106596" y="1013232"/>
-            <a:ext cx="6430513" cy="4822884"/>
-          </a:xfrm>
-          <a:prstGeom prst="rect">
-            <a:avLst/>
-          </a:prstGeom>
-        </p:spPr>
-      </p:pic>
       <p:grpSp>
         <p:nvGrpSpPr>
           <p:cNvPr id="12" name="Group 11">
@@ -17667,6 +17795,312 @@
           </a:fontRef>
         </p:style>
       </p:cxnSp>
+      <p:pic>
+        <p:nvPicPr>
+          <p:cNvPr id="4" name="Picture 3">
+            <a:extLst>
+              <a:ext uri="{FF2B5EF4-FFF2-40B4-BE49-F238E27FC236}">
+                <a16:creationId xmlns:a16="http://schemas.microsoft.com/office/drawing/2014/main" id="{43000B23-29B4-60F5-9A0F-C00C2A319320}"/>
+              </a:ext>
+            </a:extLst>
+          </p:cNvPr>
+          <p:cNvPicPr>
+            <a:picLocks noChangeAspect="1"/>
+          </p:cNvPicPr>
+          <p:nvPr/>
+        </p:nvPicPr>
+        <p:blipFill>
+          <a:blip r:embed="rId2"/>
+          <a:stretch>
+            <a:fillRect/>
+          </a:stretch>
+        </p:blipFill>
+        <p:spPr>
+          <a:xfrm>
+            <a:off x="5638144" y="790777"/>
+            <a:ext cx="5532455" cy="4939094"/>
+          </a:xfrm>
+          <a:prstGeom prst="rect">
+            <a:avLst/>
+          </a:prstGeom>
+        </p:spPr>
+      </p:pic>
+      <p:grpSp>
+        <p:nvGrpSpPr>
+          <p:cNvPr id="19" name="Group 18">
+            <a:extLst>
+              <a:ext uri="{FF2B5EF4-FFF2-40B4-BE49-F238E27FC236}">
+                <a16:creationId xmlns:a16="http://schemas.microsoft.com/office/drawing/2014/main" id="{3650F7B9-474D-8C1D-4E03-CA609384363F}"/>
+              </a:ext>
+            </a:extLst>
+          </p:cNvPr>
+          <p:cNvGrpSpPr/>
+          <p:nvPr/>
+        </p:nvGrpSpPr>
+        <p:grpSpPr>
+          <a:xfrm>
+            <a:off x="7465140" y="1036290"/>
+            <a:ext cx="1292760" cy="2802600"/>
+            <a:chOff x="7465140" y="1036290"/>
+            <a:chExt cx="1292760" cy="2802600"/>
+          </a:xfrm>
+        </p:grpSpPr>
+        <mc:AlternateContent xmlns:mc="http://schemas.openxmlformats.org/markup-compatibility/2006">
+          <mc:Choice xmlns:p14="http://schemas.microsoft.com/office/powerpoint/2010/main" Requires="p14">
+            <p:contentPart p14:bwMode="auto" r:id="rId3">
+              <p14:nvContentPartPr>
+                <p14:cNvPr id="8" name="Ink 7">
+                  <a:extLst>
+                    <a:ext uri="{FF2B5EF4-FFF2-40B4-BE49-F238E27FC236}">
+                      <a16:creationId xmlns:a16="http://schemas.microsoft.com/office/drawing/2014/main" id="{31E4E1B2-66CB-A6F4-1A77-71F24E7B2F18}"/>
+                    </a:ext>
+                  </a:extLst>
+                </p14:cNvPr>
+                <p14:cNvContentPartPr/>
+                <p14:nvPr/>
+              </p14:nvContentPartPr>
+              <p14:xfrm>
+                <a:off x="7465140" y="2532450"/>
+                <a:ext cx="811800" cy="1306440"/>
+              </p14:xfrm>
+            </p:contentPart>
+          </mc:Choice>
+          <mc:Fallback>
+            <p:pic>
+              <p:nvPicPr>
+                <p:cNvPr id="8" name="Ink 7">
+                  <a:extLst>
+                    <a:ext uri="{FF2B5EF4-FFF2-40B4-BE49-F238E27FC236}">
+                      <a16:creationId xmlns:a16="http://schemas.microsoft.com/office/drawing/2014/main" id="{31E4E1B2-66CB-A6F4-1A77-71F24E7B2F18}"/>
+                    </a:ext>
+                  </a:extLst>
+                </p:cNvPr>
+                <p:cNvPicPr/>
+                <p:nvPr/>
+              </p:nvPicPr>
+              <p:blipFill>
+                <a:blip r:embed="rId4"/>
+                <a:stretch>
+                  <a:fillRect/>
+                </a:stretch>
+              </p:blipFill>
+              <p:spPr>
+                <a:xfrm>
+                  <a:off x="7456140" y="2523810"/>
+                  <a:ext cx="829440" cy="1324080"/>
+                </a:xfrm>
+                <a:prstGeom prst="rect">
+                  <a:avLst/>
+                </a:prstGeom>
+              </p:spPr>
+            </p:pic>
+          </mc:Fallback>
+        </mc:AlternateContent>
+        <mc:AlternateContent xmlns:mc="http://schemas.openxmlformats.org/markup-compatibility/2006">
+          <mc:Choice xmlns:p14="http://schemas.microsoft.com/office/powerpoint/2010/main" Requires="p14">
+            <p:contentPart p14:bwMode="auto" r:id="rId5">
+              <p14:nvContentPartPr>
+                <p14:cNvPr id="9" name="Ink 8">
+                  <a:extLst>
+                    <a:ext uri="{FF2B5EF4-FFF2-40B4-BE49-F238E27FC236}">
+                      <a16:creationId xmlns:a16="http://schemas.microsoft.com/office/drawing/2014/main" id="{E758FAC5-A6EB-A837-88B3-7A91D37DF83E}"/>
+                    </a:ext>
+                  </a:extLst>
+                </p14:cNvPr>
+                <p14:cNvContentPartPr/>
+                <p14:nvPr/>
+              </p14:nvContentPartPr>
+              <p14:xfrm>
+                <a:off x="8286660" y="2716770"/>
+                <a:ext cx="471240" cy="1027800"/>
+              </p14:xfrm>
+            </p:contentPart>
+          </mc:Choice>
+          <mc:Fallback>
+            <p:pic>
+              <p:nvPicPr>
+                <p:cNvPr id="9" name="Ink 8">
+                  <a:extLst>
+                    <a:ext uri="{FF2B5EF4-FFF2-40B4-BE49-F238E27FC236}">
+                      <a16:creationId xmlns:a16="http://schemas.microsoft.com/office/drawing/2014/main" id="{E758FAC5-A6EB-A837-88B3-7A91D37DF83E}"/>
+                    </a:ext>
+                  </a:extLst>
+                </p:cNvPr>
+                <p:cNvPicPr/>
+                <p:nvPr/>
+              </p:nvPicPr>
+              <p:blipFill>
+                <a:blip r:embed="rId6"/>
+                <a:stretch>
+                  <a:fillRect/>
+                </a:stretch>
+              </p:blipFill>
+              <p:spPr>
+                <a:xfrm>
+                  <a:off x="8277660" y="2707770"/>
+                  <a:ext cx="488880" cy="1045440"/>
+                </a:xfrm>
+                <a:prstGeom prst="rect">
+                  <a:avLst/>
+                </a:prstGeom>
+              </p:spPr>
+            </p:pic>
+          </mc:Fallback>
+        </mc:AlternateContent>
+        <mc:AlternateContent xmlns:mc="http://schemas.openxmlformats.org/markup-compatibility/2006">
+          <mc:Choice xmlns:p14="http://schemas.microsoft.com/office/powerpoint/2010/main" Requires="p14">
+            <p:contentPart p14:bwMode="auto" r:id="rId7">
+              <p14:nvContentPartPr>
+                <p14:cNvPr id="17" name="Ink 16">
+                  <a:extLst>
+                    <a:ext uri="{FF2B5EF4-FFF2-40B4-BE49-F238E27FC236}">
+                      <a16:creationId xmlns:a16="http://schemas.microsoft.com/office/drawing/2014/main" id="{48E64251-69D4-33EF-0D57-AB01A8281F85}"/>
+                    </a:ext>
+                  </a:extLst>
+                </p14:cNvPr>
+                <p14:cNvContentPartPr/>
+                <p14:nvPr/>
+              </p14:nvContentPartPr>
+              <p14:xfrm>
+                <a:off x="8018820" y="1036290"/>
+                <a:ext cx="230040" cy="2640600"/>
+              </p14:xfrm>
+            </p:contentPart>
+          </mc:Choice>
+          <mc:Fallback>
+            <p:pic>
+              <p:nvPicPr>
+                <p:cNvPr id="17" name="Ink 16">
+                  <a:extLst>
+                    <a:ext uri="{FF2B5EF4-FFF2-40B4-BE49-F238E27FC236}">
+                      <a16:creationId xmlns:a16="http://schemas.microsoft.com/office/drawing/2014/main" id="{48E64251-69D4-33EF-0D57-AB01A8281F85}"/>
+                    </a:ext>
+                  </a:extLst>
+                </p:cNvPr>
+                <p:cNvPicPr/>
+                <p:nvPr/>
+              </p:nvPicPr>
+              <p:blipFill>
+                <a:blip r:embed="rId8"/>
+                <a:stretch>
+                  <a:fillRect/>
+                </a:stretch>
+              </p:blipFill>
+              <p:spPr>
+                <a:xfrm>
+                  <a:off x="8009820" y="1027290"/>
+                  <a:ext cx="247680" cy="2658240"/>
+                </a:xfrm>
+                <a:prstGeom prst="rect">
+                  <a:avLst/>
+                </a:prstGeom>
+              </p:spPr>
+            </p:pic>
+          </mc:Fallback>
+        </mc:AlternateContent>
+      </p:grpSp>
+      <mc:AlternateContent xmlns:mc="http://schemas.openxmlformats.org/markup-compatibility/2006">
+        <mc:Choice xmlns:p14="http://schemas.microsoft.com/office/powerpoint/2010/main" Requires="p14">
+          <p:contentPart p14:bwMode="auto" r:id="rId9">
+            <p14:nvContentPartPr>
+              <p14:cNvPr id="20" name="Ink 19">
+                <a:extLst>
+                  <a:ext uri="{FF2B5EF4-FFF2-40B4-BE49-F238E27FC236}">
+                    <a16:creationId xmlns:a16="http://schemas.microsoft.com/office/drawing/2014/main" id="{8F607FE8-30EA-E4F8-69E2-7C4B64B9A59C}"/>
+                  </a:ext>
+                </a:extLst>
+              </p14:cNvPr>
+              <p14:cNvContentPartPr/>
+              <p14:nvPr/>
+            </p14:nvContentPartPr>
+            <p14:xfrm>
+              <a:off x="8267220" y="3905130"/>
+              <a:ext cx="79560" cy="102600"/>
+            </p14:xfrm>
+          </p:contentPart>
+        </mc:Choice>
+        <mc:Fallback>
+          <p:pic>
+            <p:nvPicPr>
+              <p:cNvPr id="20" name="Ink 19">
+                <a:extLst>
+                  <a:ext uri="{FF2B5EF4-FFF2-40B4-BE49-F238E27FC236}">
+                    <a16:creationId xmlns:a16="http://schemas.microsoft.com/office/drawing/2014/main" id="{8F607FE8-30EA-E4F8-69E2-7C4B64B9A59C}"/>
+                  </a:ext>
+                </a:extLst>
+              </p:cNvPr>
+              <p:cNvPicPr/>
+              <p:nvPr/>
+            </p:nvPicPr>
+            <p:blipFill>
+              <a:blip r:embed="rId10"/>
+              <a:stretch>
+                <a:fillRect/>
+              </a:stretch>
+            </p:blipFill>
+            <p:spPr>
+              <a:xfrm>
+                <a:off x="8213580" y="3797130"/>
+                <a:ext cx="187200" cy="318240"/>
+              </a:xfrm>
+              <a:prstGeom prst="rect">
+                <a:avLst/>
+              </a:prstGeom>
+            </p:spPr>
+          </p:pic>
+        </mc:Fallback>
+      </mc:AlternateContent>
+      <mc:AlternateContent xmlns:mc="http://schemas.openxmlformats.org/markup-compatibility/2006">
+        <mc:Choice xmlns:p14="http://schemas.microsoft.com/office/powerpoint/2010/main" Requires="p14">
+          <p:contentPart p14:bwMode="auto" r:id="rId11">
+            <p14:nvContentPartPr>
+              <p14:cNvPr id="21" name="Ink 20">
+                <a:extLst>
+                  <a:ext uri="{FF2B5EF4-FFF2-40B4-BE49-F238E27FC236}">
+                    <a16:creationId xmlns:a16="http://schemas.microsoft.com/office/drawing/2014/main" id="{432CE06F-3C4C-F8EB-8B39-FBB68C55E677}"/>
+                  </a:ext>
+                </a:extLst>
+              </p14:cNvPr>
+              <p14:cNvContentPartPr/>
+              <p14:nvPr/>
+            </p14:nvContentPartPr>
+            <p14:xfrm>
+              <a:off x="8139420" y="3690570"/>
+              <a:ext cx="422280" cy="395280"/>
+            </p14:xfrm>
+          </p:contentPart>
+        </mc:Choice>
+        <mc:Fallback>
+          <p:pic>
+            <p:nvPicPr>
+              <p:cNvPr id="21" name="Ink 20">
+                <a:extLst>
+                  <a:ext uri="{FF2B5EF4-FFF2-40B4-BE49-F238E27FC236}">
+                    <a16:creationId xmlns:a16="http://schemas.microsoft.com/office/drawing/2014/main" id="{432CE06F-3C4C-F8EB-8B39-FBB68C55E677}"/>
+                  </a:ext>
+                </a:extLst>
+              </p:cNvPr>
+              <p:cNvPicPr/>
+              <p:nvPr/>
+            </p:nvPicPr>
+            <p:blipFill>
+              <a:blip r:embed="rId12"/>
+              <a:stretch>
+                <a:fillRect/>
+              </a:stretch>
+            </p:blipFill>
+            <p:spPr>
+              <a:xfrm>
+                <a:off x="8085780" y="3582930"/>
+                <a:ext cx="529920" cy="610920"/>
+              </a:xfrm>
+              <a:prstGeom prst="rect">
+                <a:avLst/>
+              </a:prstGeom>
+            </p:spPr>
+          </p:pic>
+        </mc:Fallback>
+      </mc:AlternateContent>
     </p:spTree>
     <p:extLst>
       <p:ext uri="{BB962C8B-B14F-4D97-AF65-F5344CB8AC3E}">
@@ -17879,74 +18313,17 @@
           <a:lstStyle/>
           <a:p>
             <a:r>
-              <a:rPr lang="en-US" dirty="0"/>
-              <a:t>Je bent </a:t>
-            </a:r>
-            <a:r>
-              <a:rPr lang="en-US" dirty="0" err="1"/>
-              <a:t>een</a:t>
-            </a:r>
-            <a:r>
-              <a:rPr lang="en-US" dirty="0"/>
-              <a:t> character die </a:t>
-            </a:r>
-            <a:r>
-              <a:rPr lang="en-US" dirty="0" err="1"/>
-              <a:t>niet</a:t>
-            </a:r>
-            <a:r>
-              <a:rPr lang="en-US" dirty="0"/>
-              <a:t> in de </a:t>
-            </a:r>
-            <a:r>
-              <a:rPr lang="en-US" dirty="0" err="1"/>
-              <a:t>wereld</a:t>
-            </a:r>
-            <a:r>
-              <a:rPr lang="en-US" dirty="0"/>
-              <a:t> </a:t>
-            </a:r>
-            <a:r>
-              <a:rPr lang="en-US" dirty="0" err="1"/>
-              <a:t>hoort</a:t>
-            </a:r>
-            <a:r>
-              <a:rPr lang="en-US" dirty="0"/>
-              <a:t> </a:t>
-            </a:r>
-            <a:r>
-              <a:rPr lang="en-US" dirty="0" err="1"/>
-              <a:t>en</a:t>
-            </a:r>
-            <a:r>
-              <a:rPr lang="en-US" dirty="0"/>
-              <a:t> wilt </a:t>
-            </a:r>
-            <a:r>
-              <a:rPr lang="en-US" dirty="0" err="1"/>
-              <a:t>verdwijnen</a:t>
-            </a:r>
-            <a:r>
-              <a:rPr lang="en-US" dirty="0"/>
-              <a:t> </a:t>
-            </a:r>
-            <a:r>
-              <a:rPr lang="en-US" dirty="0" err="1"/>
-              <a:t>uit</a:t>
-            </a:r>
-            <a:r>
-              <a:rPr lang="en-US" dirty="0"/>
-              <a:t> die </a:t>
-            </a:r>
-            <a:r>
-              <a:rPr lang="en-US" dirty="0" err="1"/>
-              <a:t>wereld</a:t>
-            </a:r>
-            <a:r>
-              <a:rPr lang="en-US" dirty="0"/>
-              <a:t>.</a:t>
-            </a:r>
-            <a:endParaRPr lang="nl-NL" dirty="0"/>
+              <a:rPr lang="nl-NL" dirty="0"/>
+              <a:t>In onze game ben je een dino die niet thuishoort in de wereld. Het is omdat de wereld realistische is en de dino wil naar zijn cartoon </a:t>
+            </a:r>
+            <a:r>
+              <a:rPr lang="nl-NL" dirty="0" err="1"/>
+              <a:t>style</a:t>
+            </a:r>
+            <a:r>
+              <a:rPr lang="nl-NL" dirty="0"/>
+              <a:t> wereld terug. Dat doet hij door in een portaal te vallen naar een andere wereld.</a:t>
+            </a:r>
           </a:p>
         </p:txBody>
       </p:sp>
@@ -18280,7 +18657,71 @@
             </a:r>
             <a:r>
               <a:rPr lang="en-US" dirty="0"/>
-              <a:t> is om </a:t>
+              <a:t> is om door </a:t>
+            </a:r>
+            <a:r>
+              <a:rPr lang="en-US" dirty="0" err="1"/>
+              <a:t>een</a:t>
+            </a:r>
+            <a:r>
+              <a:rPr lang="en-US" dirty="0"/>
+              <a:t> portal </a:t>
+            </a:r>
+            <a:r>
+              <a:rPr lang="en-US" dirty="0" err="1"/>
+              <a:t>te</a:t>
+            </a:r>
+            <a:r>
+              <a:rPr lang="en-US" dirty="0"/>
+              <a:t> </a:t>
+            </a:r>
+            <a:r>
+              <a:rPr lang="en-US" dirty="0" err="1"/>
+              <a:t>vallen</a:t>
+            </a:r>
+            <a:r>
+              <a:rPr lang="en-US" dirty="0"/>
+              <a:t>. </a:t>
+            </a:r>
+            <a:r>
+              <a:rPr lang="en-US" dirty="0" err="1"/>
+              <a:t>Dit</a:t>
+            </a:r>
+            <a:r>
+              <a:rPr lang="en-US" dirty="0"/>
+              <a:t> doe je </a:t>
+            </a:r>
+            <a:r>
+              <a:rPr lang="en-US" dirty="0" err="1"/>
+              <a:t>doormiddel</a:t>
+            </a:r>
+            <a:r>
+              <a:rPr lang="en-US" dirty="0"/>
+              <a:t> van het </a:t>
+            </a:r>
+            <a:r>
+              <a:rPr lang="en-US" dirty="0" err="1"/>
+              <a:t>draaien</a:t>
+            </a:r>
+            <a:r>
+              <a:rPr lang="en-US" dirty="0"/>
+              <a:t> van het level </a:t>
+            </a:r>
+            <a:r>
+              <a:rPr lang="en-US" dirty="0" err="1"/>
+              <a:t>en</a:t>
+            </a:r>
+            <a:r>
+              <a:rPr lang="en-US" dirty="0"/>
+              <a:t> door de </a:t>
+            </a:r>
+            <a:r>
+              <a:rPr lang="en-US" dirty="0" err="1"/>
+              <a:t>zwaartekracht</a:t>
+            </a:r>
+            <a:r>
+              <a:rPr lang="en-US" dirty="0"/>
+              <a:t> </a:t>
             </a:r>
             <a:r>
               <a:rPr lang="en-US" dirty="0" err="1"/>
@@ -18288,11 +18729,67 @@
             </a:r>
             <a:r>
               <a:rPr lang="en-US" dirty="0"/>
-              <a:t> het </a:t>
+              <a:t> </a:t>
             </a:r>
             <a:r>
               <a:rPr lang="en-US" dirty="0" err="1"/>
-              <a:t>einde</a:t>
+              <a:t>beneden</a:t>
+            </a:r>
+            <a:r>
+              <a:rPr lang="en-US" dirty="0"/>
+              <a:t> </a:t>
+            </a:r>
+            <a:r>
+              <a:rPr lang="en-US" dirty="0" err="1"/>
+              <a:t>te</a:t>
+            </a:r>
+            <a:r>
+              <a:rPr lang="en-US" dirty="0"/>
+              <a:t> </a:t>
+            </a:r>
+            <a:r>
+              <a:rPr lang="en-US" dirty="0" err="1"/>
+              <a:t>vallen</a:t>
+            </a:r>
+            <a:r>
+              <a:rPr lang="en-US" dirty="0"/>
+              <a:t>. </a:t>
+            </a:r>
+            <a:r>
+              <a:rPr lang="en-US" dirty="0" err="1"/>
+              <a:t>Daarnaast</a:t>
+            </a:r>
+            <a:r>
+              <a:rPr lang="en-US" dirty="0"/>
+              <a:t> </a:t>
+            </a:r>
+            <a:r>
+              <a:rPr lang="en-US" dirty="0" err="1"/>
+              <a:t>kan</a:t>
+            </a:r>
+            <a:r>
+              <a:rPr lang="en-US" dirty="0"/>
+              <a:t> je </a:t>
+            </a:r>
+            <a:r>
+              <a:rPr lang="en-US" dirty="0" err="1"/>
+              <a:t>ook</a:t>
+            </a:r>
+            <a:r>
+              <a:rPr lang="en-US" dirty="0"/>
+              <a:t> over de </a:t>
+            </a:r>
+            <a:r>
+              <a:rPr lang="en-US" dirty="0" err="1"/>
+              <a:t>paden</a:t>
+            </a:r>
+            <a:r>
+              <a:rPr lang="en-US" dirty="0"/>
+              <a:t>/</a:t>
+            </a:r>
+            <a:r>
+              <a:rPr lang="en-US" dirty="0" err="1"/>
+              <a:t>muren</a:t>
             </a:r>
             <a:r>
               <a:rPr lang="en-US" dirty="0"/>
@@ -18300,63 +18797,7 @@
             </a:r>
             <a:r>
               <a:rPr lang="en-US" dirty="0" err="1"/>
-              <a:t>te</a:t>
-            </a:r>
-            <a:r>
-              <a:rPr lang="en-US" dirty="0"/>
-              <a:t> </a:t>
-            </a:r>
-            <a:r>
-              <a:rPr lang="en-US" dirty="0" err="1"/>
-              <a:t>komen</a:t>
-            </a:r>
-            <a:r>
-              <a:rPr lang="en-US" dirty="0"/>
-              <a:t> door </a:t>
-            </a:r>
-            <a:r>
-              <a:rPr lang="en-US" dirty="0" err="1"/>
-              <a:t>middel</a:t>
-            </a:r>
-            <a:r>
-              <a:rPr lang="en-US" dirty="0"/>
-              <a:t> van </a:t>
-            </a:r>
-            <a:r>
-              <a:rPr lang="en-US" dirty="0" err="1"/>
-              <a:t>te</a:t>
-            </a:r>
-            <a:r>
-              <a:rPr lang="en-US" dirty="0"/>
-              <a:t> </a:t>
-            </a:r>
-            <a:r>
-              <a:rPr lang="en-US" dirty="0" err="1"/>
               <a:t>lopen</a:t>
-            </a:r>
-            <a:r>
-              <a:rPr lang="en-US" dirty="0"/>
-              <a:t> </a:t>
-            </a:r>
-            <a:r>
-              <a:rPr lang="en-US" dirty="0" err="1"/>
-              <a:t>en</a:t>
-            </a:r>
-            <a:r>
-              <a:rPr lang="en-US" dirty="0"/>
-              <a:t> het level </a:t>
-            </a:r>
-            <a:r>
-              <a:rPr lang="en-US" dirty="0" err="1"/>
-              <a:t>te</a:t>
-            </a:r>
-            <a:r>
-              <a:rPr lang="en-US" dirty="0"/>
-              <a:t> </a:t>
-            </a:r>
-            <a:r>
-              <a:rPr lang="en-US" dirty="0" err="1"/>
-              <a:t>draaien</a:t>
             </a:r>
             <a:r>
               <a:rPr lang="en-US" dirty="0"/>
@@ -18368,7 +18809,7 @@
             </a:r>
             <a:r>
               <a:rPr lang="en-US" dirty="0"/>
-              <a:t> je door de portal (gat) </a:t>
+              <a:t> je door de portal </a:t>
             </a:r>
             <a:r>
               <a:rPr lang="en-US" dirty="0" err="1"/>
@@ -18599,17 +19040,83 @@
           </a:p>
           <a:p>
             <a:r>
+              <a:rPr lang="en-US" dirty="0"/>
+              <a:t>Met </a:t>
+            </a:r>
+            <a:r>
               <a:rPr lang="en-US" dirty="0" err="1"/>
-              <a:t>Lopen</a:t>
+              <a:t>zwaartekracht</a:t>
+            </a:r>
+            <a:r>
+              <a:rPr lang="en-US" dirty="0"/>
+              <a:t> </a:t>
+            </a:r>
+            <a:r>
+              <a:rPr lang="en-US" dirty="0" err="1"/>
+              <a:t>naar</a:t>
+            </a:r>
+            <a:r>
+              <a:rPr lang="en-US" dirty="0"/>
+              <a:t> </a:t>
+            </a:r>
+            <a:r>
+              <a:rPr lang="en-US" dirty="0" err="1"/>
+              <a:t>beneden</a:t>
+            </a:r>
+            <a:r>
+              <a:rPr lang="en-US" dirty="0"/>
+              <a:t> </a:t>
+            </a:r>
+            <a:r>
+              <a:rPr lang="en-US" dirty="0" err="1"/>
+              <a:t>vallen</a:t>
+            </a:r>
+            <a:r>
+              <a:rPr lang="en-US" dirty="0"/>
+              <a:t> </a:t>
+            </a:r>
+            <a:r>
+              <a:rPr lang="en-US" dirty="0" err="1"/>
+              <a:t>als</a:t>
+            </a:r>
+            <a:r>
+              <a:rPr lang="en-US" dirty="0"/>
+              <a:t> </a:t>
+            </a:r>
+            <a:r>
+              <a:rPr lang="en-US" dirty="0" err="1"/>
+              <a:t>speler</a:t>
             </a:r>
             <a:endParaRPr lang="en-US" dirty="0"/>
           </a:p>
           <a:p>
             <a:r>
-              <a:rPr lang="en-US"/>
-              <a:t>Verdwijnen</a:t>
-            </a:r>
-            <a:endParaRPr lang="nl-NL"/>
+              <a:rPr lang="en-US" dirty="0" err="1"/>
+              <a:t>Lopen</a:t>
+            </a:r>
+            <a:r>
+              <a:rPr lang="en-US" dirty="0"/>
+              <a:t> over de </a:t>
+            </a:r>
+            <a:r>
+              <a:rPr lang="en-US" dirty="0" err="1"/>
+              <a:t>randen</a:t>
+            </a:r>
+            <a:r>
+              <a:rPr lang="en-US" dirty="0"/>
+              <a:t> van het level</a:t>
+            </a:r>
+          </a:p>
+          <a:p>
+            <a:r>
+              <a:rPr lang="en-US" dirty="0" err="1"/>
+              <a:t>Vallen</a:t>
+            </a:r>
+            <a:r>
+              <a:rPr lang="en-US" dirty="0"/>
+              <a:t> door het portal</a:t>
+            </a:r>
+            <a:endParaRPr lang="nl-NL" dirty="0"/>
           </a:p>
         </p:txBody>
       </p:sp>

</xml_diff>